<commit_message>
adding one slide (Bonus)
</commit_message>
<xml_diff>
--- a/SheepHerderDocs/Final Presentation.pptx
+++ b/SheepHerderDocs/Final Presentation.pptx
@@ -5,10 +5,10 @@
     <p:sldMasterId id="2147483907" r:id="rId1"/>
   </p:sldMasterIdLst>
   <p:notesMasterIdLst>
-    <p:notesMasterId r:id="rId21"/>
+    <p:notesMasterId r:id="rId22"/>
   </p:notesMasterIdLst>
   <p:handoutMasterIdLst>
-    <p:handoutMasterId r:id="rId22"/>
+    <p:handoutMasterId r:id="rId23"/>
   </p:handoutMasterIdLst>
   <p:sldIdLst>
     <p:sldId id="258" r:id="rId2"/>
@@ -29,7 +29,8 @@
     <p:sldId id="290" r:id="rId17"/>
     <p:sldId id="291" r:id="rId18"/>
     <p:sldId id="272" r:id="rId19"/>
-    <p:sldId id="285" r:id="rId20"/>
+    <p:sldId id="292" r:id="rId20"/>
+    <p:sldId id="285" r:id="rId21"/>
   </p:sldIdLst>
   <p:sldSz cx="9144000" cy="6858000" type="screen4x3"/>
   <p:notesSz cx="6858000" cy="9144000"/>
@@ -384,11 +385,11 @@
             </c:numRef>
           </c:val>
         </c:ser>
-        <c:axId val="44731008"/>
-        <c:axId val="44757376"/>
+        <c:axId val="62516224"/>
+        <c:axId val="62587648"/>
       </c:barChart>
       <c:catAx>
-        <c:axId val="44731008"/>
+        <c:axId val="62516224"/>
         <c:scaling>
           <c:orientation val="minMax"/>
         </c:scaling>
@@ -398,14 +399,14 @@
         <c:spPr>
           <a:ln w="6350"/>
         </c:spPr>
-        <c:crossAx val="44757376"/>
+        <c:crossAx val="62587648"/>
         <c:crosses val="autoZero"/>
         <c:auto val="1"/>
         <c:lblAlgn val="ctr"/>
         <c:lblOffset val="100"/>
       </c:catAx>
       <c:valAx>
-        <c:axId val="44757376"/>
+        <c:axId val="62587648"/>
         <c:scaling>
           <c:orientation val="minMax"/>
         </c:scaling>
@@ -427,7 +428,7 @@
             <a:noFill/>
           </a:ln>
         </c:spPr>
-        <c:crossAx val="44731008"/>
+        <c:crossAx val="62516224"/>
         <c:crosses val="autoZero"/>
         <c:crossBetween val="between"/>
       </c:valAx>
@@ -440,7 +441,6 @@
     </c:plotArea>
     <c:legend>
       <c:legendPos val="t"/>
-      <c:layout/>
       <c:spPr>
         <a:ln>
           <a:noFill/>
@@ -479,7 +479,6 @@
   <c:clrMapOvr bg1="lt1" tx1="dk1" bg2="lt2" tx2="dk2" accent1="accent1" accent2="accent2" accent3="accent3" accent4="accent4" accent5="accent5" accent6="accent6" hlink="hlink" folHlink="folHlink"/>
   <c:chart>
     <c:title>
-      <c:layout/>
       <c:txPr>
         <a:bodyPr/>
         <a:lstStyle/>
@@ -721,7 +720,6 @@
     </c:plotArea>
     <c:legend>
       <c:legendPos val="t"/>
-      <c:layout/>
       <c:spPr>
         <a:ln>
           <a:noFill/>
@@ -951,7 +949,7 @@
     </p:spTree>
     <p:extLst>
       <p:ext uri="{BB962C8B-B14F-4D97-AF65-F5344CB8AC3E}">
-        <p14:creationId xmlns="" xmlns:p14="http://schemas.microsoft.com/office/powerpoint/2010/main" val="3319920937"/>
+        <p14:creationId xmlns:p14="http://schemas.microsoft.com/office/powerpoint/2010/main" xmlns="" val="3319920937"/>
       </p:ext>
     </p:extLst>
   </p:cSld>
@@ -1227,7 +1225,7 @@
     </p:spTree>
     <p:extLst>
       <p:ext uri="{BB962C8B-B14F-4D97-AF65-F5344CB8AC3E}">
-        <p14:creationId xmlns="" xmlns:p14="http://schemas.microsoft.com/office/powerpoint/2010/main" val="2500505524"/>
+        <p14:creationId xmlns:p14="http://schemas.microsoft.com/office/powerpoint/2010/main" xmlns="" val="2500505524"/>
       </p:ext>
     </p:extLst>
   </p:cSld>
@@ -1414,7 +1412,7 @@
     </p:spTree>
     <p:extLst>
       <p:ext uri="{BB962C8B-B14F-4D97-AF65-F5344CB8AC3E}">
-        <p14:creationId xmlns="" xmlns:p14="http://schemas.microsoft.com/office/powerpoint/2010/main" val="2376658476"/>
+        <p14:creationId xmlns:p14="http://schemas.microsoft.com/office/powerpoint/2010/main" xmlns="" val="2376658476"/>
       </p:ext>
     </p:extLst>
   </p:cSld>
@@ -2374,9 +2372,96 @@
     </p:spTree>
     <p:extLst>
       <p:ext uri="{BB962C8B-B14F-4D97-AF65-F5344CB8AC3E}">
-        <p14:creationId xmlns="" xmlns:p14="http://schemas.microsoft.com/office/powerpoint/2010/main" val="2376658476"/>
+        <p14:creationId xmlns:p14="http://schemas.microsoft.com/office/powerpoint/2010/main" xmlns="" val="2376658476"/>
       </p:ext>
     </p:extLst>
+  </p:cSld>
+  <p:clrMapOvr>
+    <a:masterClrMapping/>
+  </p:clrMapOvr>
+</p:notes>
+</file>
+
+<file path=ppt/notesSlides/notesSlide20.xml><?xml version="1.0" encoding="utf-8"?>
+<p:notes xmlns:a="http://schemas.openxmlformats.org/drawingml/2006/main" xmlns:r="http://schemas.openxmlformats.org/officeDocument/2006/relationships" xmlns:p="http://schemas.openxmlformats.org/presentationml/2006/main">
+  <p:cSld>
+    <p:spTree>
+      <p:nvGrpSpPr>
+        <p:cNvPr id="1" name=""/>
+        <p:cNvGrpSpPr/>
+        <p:nvPr/>
+      </p:nvGrpSpPr>
+      <p:grpSpPr>
+        <a:xfrm>
+          <a:off x="0" y="0"/>
+          <a:ext cx="0" cy="0"/>
+          <a:chOff x="0" y="0"/>
+          <a:chExt cx="0" cy="0"/>
+        </a:xfrm>
+      </p:grpSpPr>
+      <p:sp>
+        <p:nvSpPr>
+          <p:cNvPr id="2" name="Slide Image Placeholder 1"/>
+          <p:cNvSpPr>
+            <a:spLocks noGrp="1" noRot="1" noChangeAspect="1"/>
+          </p:cNvSpPr>
+          <p:nvPr>
+            <p:ph type="sldImg"/>
+          </p:nvPr>
+        </p:nvSpPr>
+        <p:spPr>
+          <a:xfrm>
+            <a:off x="534988" y="611188"/>
+            <a:ext cx="4321175" cy="3240087"/>
+          </a:xfrm>
+        </p:spPr>
+      </p:sp>
+      <p:sp>
+        <p:nvSpPr>
+          <p:cNvPr id="3" name="Notes Placeholder 2"/>
+          <p:cNvSpPr>
+            <a:spLocks noGrp="1"/>
+          </p:cNvSpPr>
+          <p:nvPr>
+            <p:ph type="body" idx="1"/>
+          </p:nvPr>
+        </p:nvSpPr>
+        <p:spPr/>
+        <p:txBody>
+          <a:bodyPr>
+            <a:normAutofit/>
+          </a:bodyPr>
+          <a:lstStyle/>
+          <a:p>
+            <a:endParaRPr lang="nl-NL"/>
+          </a:p>
+        </p:txBody>
+      </p:sp>
+      <p:sp>
+        <p:nvSpPr>
+          <p:cNvPr id="4" name="Slide Number Placeholder 3"/>
+          <p:cNvSpPr>
+            <a:spLocks noGrp="1"/>
+          </p:cNvSpPr>
+          <p:nvPr>
+            <p:ph type="sldNum" sz="quarter" idx="10"/>
+          </p:nvPr>
+        </p:nvSpPr>
+        <p:spPr/>
+        <p:txBody>
+          <a:bodyPr/>
+          <a:lstStyle/>
+          <a:p>
+            <a:fld id="{66A9D088-043F-49E2-A77E-8480DA715595}" type="slidenum">
+              <a:rPr lang="en-GB" smtClean="0"/>
+              <a:pPr/>
+              <a:t>20</a:t>
+            </a:fld>
+            <a:endParaRPr lang="en-GB" dirty="0"/>
+          </a:p>
+        </p:txBody>
+      </p:sp>
+    </p:spTree>
   </p:cSld>
   <p:clrMapOvr>
     <a:masterClrMapping/>
@@ -4183,7 +4268,7 @@
           <a:blip r:embed="rId2" cstate="print">
             <a:extLst>
               <a:ext uri="{28A0092B-C50C-407E-A947-70E740481C1C}">
-                <a14:useLocalDpi xmlns="" xmlns:a14="http://schemas.microsoft.com/office/drawing/2010/main" val="0"/>
+                <a14:useLocalDpi xmlns:a14="http://schemas.microsoft.com/office/drawing/2010/main" xmlns="" val="0"/>
               </a:ext>
             </a:extLst>
           </a:blip>
@@ -4240,7 +4325,7 @@
     </p:spTree>
     <p:extLst>
       <p:ext uri="{BB962C8B-B14F-4D97-AF65-F5344CB8AC3E}">
-        <p14:creationId xmlns="" xmlns:p14="http://schemas.microsoft.com/office/powerpoint/2010/main" val="4172443058"/>
+        <p14:creationId xmlns:p14="http://schemas.microsoft.com/office/powerpoint/2010/main" xmlns="" val="4172443058"/>
       </p:ext>
     </p:extLst>
   </p:cSld>
@@ -4462,7 +4547,7 @@
           <a:blip r:embed="rId2" cstate="print">
             <a:extLst>
               <a:ext uri="{28A0092B-C50C-407E-A947-70E740481C1C}">
-                <a14:useLocalDpi xmlns="" xmlns:a14="http://schemas.microsoft.com/office/drawing/2010/main" val="0"/>
+                <a14:useLocalDpi xmlns:a14="http://schemas.microsoft.com/office/drawing/2010/main" xmlns="" val="0"/>
               </a:ext>
             </a:extLst>
           </a:blip>
@@ -4519,7 +4604,7 @@
     </p:spTree>
     <p:extLst>
       <p:ext uri="{BB962C8B-B14F-4D97-AF65-F5344CB8AC3E}">
-        <p14:creationId xmlns="" xmlns:p14="http://schemas.microsoft.com/office/powerpoint/2010/main" val="893659651"/>
+        <p14:creationId xmlns:p14="http://schemas.microsoft.com/office/powerpoint/2010/main" xmlns="" val="893659651"/>
       </p:ext>
     </p:extLst>
   </p:cSld>
@@ -4737,7 +4822,7 @@
           <a:blip r:embed="rId2" cstate="print">
             <a:extLst>
               <a:ext uri="{28A0092B-C50C-407E-A947-70E740481C1C}">
-                <a14:useLocalDpi xmlns="" xmlns:a14="http://schemas.microsoft.com/office/drawing/2010/main" val="0"/>
+                <a14:useLocalDpi xmlns:a14="http://schemas.microsoft.com/office/drawing/2010/main" xmlns="" val="0"/>
               </a:ext>
             </a:extLst>
           </a:blip>
@@ -4862,7 +4947,7 @@
     </p:spTree>
     <p:extLst>
       <p:ext uri="{BB962C8B-B14F-4D97-AF65-F5344CB8AC3E}">
-        <p14:creationId xmlns="" xmlns:p14="http://schemas.microsoft.com/office/powerpoint/2010/main" val="1397017739"/>
+        <p14:creationId xmlns:p14="http://schemas.microsoft.com/office/powerpoint/2010/main" xmlns="" val="1397017739"/>
       </p:ext>
     </p:extLst>
   </p:cSld>
@@ -5069,7 +5154,7 @@
           <a:blip r:embed="rId2" cstate="print">
             <a:extLst>
               <a:ext uri="{28A0092B-C50C-407E-A947-70E740481C1C}">
-                <a14:useLocalDpi xmlns="" xmlns:a14="http://schemas.microsoft.com/office/drawing/2010/main" val="0"/>
+                <a14:useLocalDpi xmlns:a14="http://schemas.microsoft.com/office/drawing/2010/main" xmlns="" val="0"/>
               </a:ext>
             </a:extLst>
           </a:blip>
@@ -5099,7 +5184,7 @@
           <a:blip r:embed="rId3" cstate="print">
             <a:extLst>
               <a:ext uri="{28A0092B-C50C-407E-A947-70E740481C1C}">
-                <a14:useLocalDpi xmlns="" xmlns:a14="http://schemas.microsoft.com/office/drawing/2010/main" val="0"/>
+                <a14:useLocalDpi xmlns:a14="http://schemas.microsoft.com/office/drawing/2010/main" xmlns="" val="0"/>
               </a:ext>
             </a:extLst>
           </a:blip>
@@ -5159,7 +5244,7 @@
     </p:spTree>
     <p:extLst>
       <p:ext uri="{BB962C8B-B14F-4D97-AF65-F5344CB8AC3E}">
-        <p14:creationId xmlns="" xmlns:p14="http://schemas.microsoft.com/office/powerpoint/2010/main" val="224187675"/>
+        <p14:creationId xmlns:p14="http://schemas.microsoft.com/office/powerpoint/2010/main" xmlns="" val="224187675"/>
       </p:ext>
     </p:extLst>
   </p:cSld>
@@ -5366,7 +5451,7 @@
           <a:blip r:embed="rId2" cstate="print">
             <a:extLst>
               <a:ext uri="{28A0092B-C50C-407E-A947-70E740481C1C}">
-                <a14:useLocalDpi xmlns="" xmlns:a14="http://schemas.microsoft.com/office/drawing/2010/main" val="0"/>
+                <a14:useLocalDpi xmlns:a14="http://schemas.microsoft.com/office/drawing/2010/main" xmlns="" val="0"/>
               </a:ext>
             </a:extLst>
           </a:blip>
@@ -5396,7 +5481,7 @@
           <a:blip r:embed="rId3" cstate="print">
             <a:extLst>
               <a:ext uri="{28A0092B-C50C-407E-A947-70E740481C1C}">
-                <a14:useLocalDpi xmlns="" xmlns:a14="http://schemas.microsoft.com/office/drawing/2010/main" val="0"/>
+                <a14:useLocalDpi xmlns:a14="http://schemas.microsoft.com/office/drawing/2010/main" xmlns="" val="0"/>
               </a:ext>
             </a:extLst>
           </a:blip>
@@ -5456,7 +5541,7 @@
     </p:spTree>
     <p:extLst>
       <p:ext uri="{BB962C8B-B14F-4D97-AF65-F5344CB8AC3E}">
-        <p14:creationId xmlns="" xmlns:p14="http://schemas.microsoft.com/office/powerpoint/2010/main" val="127214035"/>
+        <p14:creationId xmlns:p14="http://schemas.microsoft.com/office/powerpoint/2010/main" xmlns="" val="127214035"/>
       </p:ext>
     </p:extLst>
   </p:cSld>
@@ -5596,7 +5681,7 @@
           <a:blip r:embed="rId2" cstate="print">
             <a:extLst>
               <a:ext uri="{28A0092B-C50C-407E-A947-70E740481C1C}">
-                <a14:useLocalDpi xmlns="" xmlns:a14="http://schemas.microsoft.com/office/drawing/2010/main" val="0"/>
+                <a14:useLocalDpi xmlns:a14="http://schemas.microsoft.com/office/drawing/2010/main" xmlns="" val="0"/>
               </a:ext>
             </a:extLst>
           </a:blip>
@@ -5689,7 +5774,7 @@
     </p:spTree>
     <p:extLst>
       <p:ext uri="{BB962C8B-B14F-4D97-AF65-F5344CB8AC3E}">
-        <p14:creationId xmlns="" xmlns:p14="http://schemas.microsoft.com/office/powerpoint/2010/main" val="3004179911"/>
+        <p14:creationId xmlns:p14="http://schemas.microsoft.com/office/powerpoint/2010/main" xmlns="" val="3004179911"/>
       </p:ext>
     </p:extLst>
   </p:cSld>
@@ -5896,7 +5981,7 @@
           <a:effectLst/>
           <a:extLst>
             <a:ext uri="{AF507438-7753-43e0-B8FC-AC1667EBCBE1}">
-              <a14:hiddenEffects xmlns="" xmlns:a14="http://schemas.microsoft.com/office/drawing/2010/main">
+              <a14:hiddenEffects xmlns:a14="http://schemas.microsoft.com/office/drawing/2010/main" xmlns="">
                 <a:effectLst>
                   <a:outerShdw dist="35921" dir="2700000" algn="ctr" rotWithShape="0">
                     <a:schemeClr val="bg2"/>
@@ -5962,7 +6047,7 @@
           <a:blip r:embed="rId2" cstate="print">
             <a:extLst>
               <a:ext uri="{28A0092B-C50C-407E-A947-70E740481C1C}">
-                <a14:useLocalDpi xmlns="" xmlns:a14="http://schemas.microsoft.com/office/drawing/2010/main" val="0"/>
+                <a14:useLocalDpi xmlns:a14="http://schemas.microsoft.com/office/drawing/2010/main" xmlns="" val="0"/>
               </a:ext>
             </a:extLst>
           </a:blip>
@@ -6019,7 +6104,7 @@
     </p:spTree>
     <p:extLst>
       <p:ext uri="{BB962C8B-B14F-4D97-AF65-F5344CB8AC3E}">
-        <p14:creationId xmlns="" xmlns:p14="http://schemas.microsoft.com/office/powerpoint/2010/main" val="86675937"/>
+        <p14:creationId xmlns:p14="http://schemas.microsoft.com/office/powerpoint/2010/main" xmlns="" val="86675937"/>
       </p:ext>
     </p:extLst>
   </p:cSld>
@@ -6349,7 +6434,7 @@
           <a:blip r:embed="rId2" cstate="print">
             <a:extLst>
               <a:ext uri="{28A0092B-C50C-407E-A947-70E740481C1C}">
-                <a14:useLocalDpi xmlns="" xmlns:a14="http://schemas.microsoft.com/office/drawing/2010/main" val="0"/>
+                <a14:useLocalDpi xmlns:a14="http://schemas.microsoft.com/office/drawing/2010/main" xmlns="" val="0"/>
               </a:ext>
             </a:extLst>
           </a:blip>
@@ -6406,7 +6491,7 @@
     </p:spTree>
     <p:extLst>
       <p:ext uri="{BB962C8B-B14F-4D97-AF65-F5344CB8AC3E}">
-        <p14:creationId xmlns="" xmlns:p14="http://schemas.microsoft.com/office/powerpoint/2010/main" val="8285584"/>
+        <p14:creationId xmlns:p14="http://schemas.microsoft.com/office/powerpoint/2010/main" xmlns="" val="8285584"/>
       </p:ext>
     </p:extLst>
   </p:cSld>
@@ -6531,7 +6616,7 @@
           <a:blip r:embed="rId2" cstate="print">
             <a:extLst>
               <a:ext uri="{28A0092B-C50C-407E-A947-70E740481C1C}">
-                <a14:useLocalDpi xmlns="" xmlns:a14="http://schemas.microsoft.com/office/drawing/2010/main" val="0"/>
+                <a14:useLocalDpi xmlns:a14="http://schemas.microsoft.com/office/drawing/2010/main" xmlns="" val="0"/>
               </a:ext>
             </a:extLst>
           </a:blip>
@@ -6556,7 +6641,7 @@
           <p:nvPr userDrawn="1">
             <p:extLst>
               <p:ext uri="{D42A27DB-BD31-4B8C-83A1-F6EECF244321}">
-                <p14:modId xmlns="" xmlns:p14="http://schemas.microsoft.com/office/powerpoint/2010/main" val="1618250192"/>
+                <p14:modId xmlns:p14="http://schemas.microsoft.com/office/powerpoint/2010/main" xmlns="" val="1618250192"/>
               </p:ext>
             </p:extLst>
           </p:nvPr>
@@ -6610,7 +6695,7 @@
     </p:spTree>
     <p:extLst>
       <p:ext uri="{BB962C8B-B14F-4D97-AF65-F5344CB8AC3E}">
-        <p14:creationId xmlns="" xmlns:p14="http://schemas.microsoft.com/office/powerpoint/2010/main" val="804500376"/>
+        <p14:creationId xmlns:p14="http://schemas.microsoft.com/office/powerpoint/2010/main" xmlns="" val="804500376"/>
       </p:ext>
     </p:extLst>
   </p:cSld>
@@ -6730,7 +6815,7 @@
           <a:blip r:embed="rId2" cstate="print">
             <a:extLst>
               <a:ext uri="{28A0092B-C50C-407E-A947-70E740481C1C}">
-                <a14:useLocalDpi xmlns="" xmlns:a14="http://schemas.microsoft.com/office/drawing/2010/main" val="0"/>
+                <a14:useLocalDpi xmlns:a14="http://schemas.microsoft.com/office/drawing/2010/main" xmlns="" val="0"/>
               </a:ext>
             </a:extLst>
           </a:blip>
@@ -6755,7 +6840,7 @@
           <p:nvPr userDrawn="1">
             <p:extLst>
               <p:ext uri="{D42A27DB-BD31-4B8C-83A1-F6EECF244321}">
-                <p14:modId xmlns="" xmlns:p14="http://schemas.microsoft.com/office/powerpoint/2010/main" val="1658717376"/>
+                <p14:modId xmlns:p14="http://schemas.microsoft.com/office/powerpoint/2010/main" xmlns="" val="1658717376"/>
               </p:ext>
             </p:extLst>
           </p:nvPr>
@@ -6809,7 +6894,7 @@
     </p:spTree>
     <p:extLst>
       <p:ext uri="{BB962C8B-B14F-4D97-AF65-F5344CB8AC3E}">
-        <p14:creationId xmlns="" xmlns:p14="http://schemas.microsoft.com/office/powerpoint/2010/main" val="3472530406"/>
+        <p14:creationId xmlns:p14="http://schemas.microsoft.com/office/powerpoint/2010/main" xmlns="" val="3472530406"/>
       </p:ext>
     </p:extLst>
   </p:cSld>
@@ -6929,7 +7014,7 @@
           <a:blip r:embed="rId2" cstate="print">
             <a:extLst>
               <a:ext uri="{28A0092B-C50C-407E-A947-70E740481C1C}">
-                <a14:useLocalDpi xmlns="" xmlns:a14="http://schemas.microsoft.com/office/drawing/2010/main" val="0"/>
+                <a14:useLocalDpi xmlns:a14="http://schemas.microsoft.com/office/drawing/2010/main" xmlns="" val="0"/>
               </a:ext>
             </a:extLst>
           </a:blip>
@@ -6986,7 +7071,7 @@
     </p:spTree>
     <p:extLst>
       <p:ext uri="{BB962C8B-B14F-4D97-AF65-F5344CB8AC3E}">
-        <p14:creationId xmlns="" xmlns:p14="http://schemas.microsoft.com/office/powerpoint/2010/main" val="2188433489"/>
+        <p14:creationId xmlns:p14="http://schemas.microsoft.com/office/powerpoint/2010/main" xmlns="" val="2188433489"/>
       </p:ext>
     </p:extLst>
   </p:cSld>
@@ -7170,7 +7255,7 @@
           <a:blip r:embed="rId2" cstate="print">
             <a:extLst>
               <a:ext uri="{28A0092B-C50C-407E-A947-70E740481C1C}">
-                <a14:useLocalDpi xmlns="" xmlns:a14="http://schemas.microsoft.com/office/drawing/2010/main" val="0"/>
+                <a14:useLocalDpi xmlns:a14="http://schemas.microsoft.com/office/drawing/2010/main" xmlns="" val="0"/>
               </a:ext>
             </a:extLst>
           </a:blip>
@@ -7227,7 +7312,7 @@
     </p:spTree>
     <p:extLst>
       <p:ext uri="{BB962C8B-B14F-4D97-AF65-F5344CB8AC3E}">
-        <p14:creationId xmlns="" xmlns:p14="http://schemas.microsoft.com/office/powerpoint/2010/main" val="1793845065"/>
+        <p14:creationId xmlns:p14="http://schemas.microsoft.com/office/powerpoint/2010/main" xmlns="" val="1793845065"/>
       </p:ext>
     </p:extLst>
   </p:cSld>
@@ -7416,7 +7501,7 @@
           <a:blip r:embed="rId2" cstate="print">
             <a:extLst>
               <a:ext uri="{28A0092B-C50C-407E-A947-70E740481C1C}">
-                <a14:useLocalDpi xmlns="" xmlns:a14="http://schemas.microsoft.com/office/drawing/2010/main" val="0"/>
+                <a14:useLocalDpi xmlns:a14="http://schemas.microsoft.com/office/drawing/2010/main" xmlns="" val="0"/>
               </a:ext>
             </a:extLst>
           </a:blip>
@@ -7473,7 +7558,7 @@
     </p:spTree>
     <p:extLst>
       <p:ext uri="{BB962C8B-B14F-4D97-AF65-F5344CB8AC3E}">
-        <p14:creationId xmlns="" xmlns:p14="http://schemas.microsoft.com/office/powerpoint/2010/main" val="1669791555"/>
+        <p14:creationId xmlns:p14="http://schemas.microsoft.com/office/powerpoint/2010/main" xmlns="" val="1669791555"/>
       </p:ext>
     </p:extLst>
   </p:cSld>
@@ -8078,7 +8163,7 @@
           <a:blip r:embed="rId2" cstate="print">
             <a:extLst>
               <a:ext uri="{28A0092B-C50C-407E-A947-70E740481C1C}">
-                <a14:useLocalDpi xmlns="" xmlns:a14="http://schemas.microsoft.com/office/drawing/2010/main" val="0"/>
+                <a14:useLocalDpi xmlns:a14="http://schemas.microsoft.com/office/drawing/2010/main" xmlns="" val="0"/>
               </a:ext>
             </a:extLst>
           </a:blip>
@@ -10208,7 +10293,7 @@
     </p:spTree>
     <p:extLst>
       <p:ext uri="{BB962C8B-B14F-4D97-AF65-F5344CB8AC3E}">
-        <p14:creationId xmlns="" xmlns:p14="http://schemas.microsoft.com/office/powerpoint/2010/main" val="828821643"/>
+        <p14:creationId xmlns:p14="http://schemas.microsoft.com/office/powerpoint/2010/main" xmlns="" val="828821643"/>
       </p:ext>
     </p:extLst>
   </p:cSld>
@@ -10266,11 +10351,7 @@
           <a:p>
             <a:r>
               <a:rPr lang="en-GB" sz="2800" b="1" dirty="0" smtClean="0"/>
-              <a:t>Recap: Project </a:t>
-            </a:r>
-            <a:r>
-              <a:rPr lang="en-GB" sz="2800" b="1" dirty="0" smtClean="0"/>
-              <a:t>Design and Navigation</a:t>
+              <a:t>Recap: Project Design and Navigation</a:t>
             </a:r>
             <a:endParaRPr lang="en-GB" sz="2800" b="1" dirty="0"/>
           </a:p>
@@ -10335,7 +10416,7 @@
     </p:spTree>
     <p:extLst>
       <p:ext uri="{BB962C8B-B14F-4D97-AF65-F5344CB8AC3E}">
-        <p14:creationId xmlns="" xmlns:p14="http://schemas.microsoft.com/office/powerpoint/2010/main" val="4290846282"/>
+        <p14:creationId xmlns:p14="http://schemas.microsoft.com/office/powerpoint/2010/main" xmlns="" val="4290846282"/>
       </p:ext>
     </p:extLst>
   </p:cSld>
@@ -10393,11 +10474,7 @@
           <a:p>
             <a:r>
               <a:rPr lang="en-GB" sz="2800" b="1" dirty="0" smtClean="0"/>
-              <a:t>Recap: Project </a:t>
-            </a:r>
-            <a:r>
-              <a:rPr lang="en-GB" sz="2800" b="1" dirty="0" smtClean="0"/>
-              <a:t>Design and Navigation</a:t>
+              <a:t>Recap: Project Design and Navigation</a:t>
             </a:r>
             <a:endParaRPr lang="en-GB" sz="2800" b="1" dirty="0"/>
           </a:p>
@@ -10462,7 +10539,7 @@
     </p:spTree>
     <p:extLst>
       <p:ext uri="{BB962C8B-B14F-4D97-AF65-F5344CB8AC3E}">
-        <p14:creationId xmlns="" xmlns:p14="http://schemas.microsoft.com/office/powerpoint/2010/main" val="4290846282"/>
+        <p14:creationId xmlns:p14="http://schemas.microsoft.com/office/powerpoint/2010/main" xmlns="" val="4290846282"/>
       </p:ext>
     </p:extLst>
   </p:cSld>
@@ -10520,11 +10597,7 @@
           <a:p>
             <a:r>
               <a:rPr lang="en-GB" sz="2800" b="1" dirty="0" smtClean="0"/>
-              <a:t>Recap: Project </a:t>
-            </a:r>
-            <a:r>
-              <a:rPr lang="en-GB" sz="2800" b="1" dirty="0" smtClean="0"/>
-              <a:t>Design and Navigation</a:t>
+              <a:t>Recap: Project Design and Navigation</a:t>
             </a:r>
             <a:endParaRPr lang="en-GB" sz="2800" b="1" dirty="0"/>
           </a:p>
@@ -10589,7 +10662,7 @@
     </p:spTree>
     <p:extLst>
       <p:ext uri="{BB962C8B-B14F-4D97-AF65-F5344CB8AC3E}">
-        <p14:creationId xmlns="" xmlns:p14="http://schemas.microsoft.com/office/powerpoint/2010/main" val="4290846282"/>
+        <p14:creationId xmlns:p14="http://schemas.microsoft.com/office/powerpoint/2010/main" xmlns="" val="4290846282"/>
       </p:ext>
     </p:extLst>
   </p:cSld>
@@ -10719,7 +10792,7 @@
     </p:spTree>
     <p:extLst>
       <p:ext uri="{BB962C8B-B14F-4D97-AF65-F5344CB8AC3E}">
-        <p14:creationId xmlns="" xmlns:p14="http://schemas.microsoft.com/office/powerpoint/2010/main" val="538637548"/>
+        <p14:creationId xmlns:p14="http://schemas.microsoft.com/office/powerpoint/2010/main" xmlns="" val="538637548"/>
       </p:ext>
     </p:extLst>
   </p:cSld>
@@ -10816,7 +10889,7 @@
           <p:nvPr>
             <p:extLst>
               <p:ext uri="{D42A27DB-BD31-4B8C-83A1-F6EECF244321}">
-                <p14:modId xmlns:p14="http://schemas.microsoft.com/office/powerpoint/2010/main" xmlns="" val="3175424385"/>
+                <p14:modId xmlns="" xmlns:p14="http://schemas.microsoft.com/office/powerpoint/2010/main" val="3175424385"/>
               </p:ext>
             </p:extLst>
           </p:nvPr>
@@ -10877,11 +10950,7 @@
                     <a:p>
                       <a:r>
                         <a:rPr lang="en-GB" sz="1600" dirty="0" smtClean="0"/>
-                        <a:t>Sheep can go in the </a:t>
-                      </a:r>
-                      <a:r>
-                        <a:rPr lang="en-GB" sz="1600" dirty="0" smtClean="0"/>
-                        <a:t>direction</a:t>
+                        <a:t>Sheep can go in the direction</a:t>
                       </a:r>
                       <a:r>
                         <a:rPr lang="en-GB" sz="1600" baseline="0" dirty="0" smtClean="0"/>
@@ -10966,11 +11035,7 @@
                     <a:p>
                       <a:r>
                         <a:rPr lang="en-US" sz="1600" dirty="0" smtClean="0"/>
-                        <a:t>Dog </a:t>
-                      </a:r>
-                      <a:r>
-                        <a:rPr lang="en-US" sz="1600" dirty="0" smtClean="0"/>
-                        <a:t>can herd</a:t>
+                        <a:t>Dog can herd</a:t>
                       </a:r>
                       <a:r>
                         <a:rPr lang="en-US" sz="1600" baseline="0" dirty="0" smtClean="0"/>
@@ -11121,19 +11186,7 @@
                       </a:pPr>
                       <a:r>
                         <a:rPr lang="en-US" sz="1600" dirty="0" smtClean="0"/>
-                        <a:t>Fox </a:t>
-                      </a:r>
-                      <a:r>
-                        <a:rPr lang="en-US" sz="1600" dirty="0" smtClean="0"/>
-                        <a:t>runs </a:t>
-                      </a:r>
-                      <a:r>
-                        <a:rPr lang="en-US" sz="1600" dirty="0" smtClean="0"/>
-                        <a:t>away </a:t>
-                      </a:r>
-                      <a:r>
-                        <a:rPr lang="en-US" sz="1600" dirty="0" smtClean="0"/>
-                        <a:t>from</a:t>
+                        <a:t>Fox runs away from</a:t>
                       </a:r>
                       <a:r>
                         <a:rPr lang="en-US" sz="1600" baseline="0" dirty="0" smtClean="0"/>
@@ -11169,7 +11222,7 @@
     </p:spTree>
     <p:extLst>
       <p:ext uri="{BB962C8B-B14F-4D97-AF65-F5344CB8AC3E}">
-        <p14:creationId xmlns="" xmlns:p14="http://schemas.microsoft.com/office/powerpoint/2010/main" val="4290846282"/>
+        <p14:creationId xmlns:p14="http://schemas.microsoft.com/office/powerpoint/2010/main" xmlns="" val="4290846282"/>
       </p:ext>
     </p:extLst>
   </p:cSld>
@@ -11266,7 +11319,7 @@
           <p:nvPr>
             <p:extLst>
               <p:ext uri="{D42A27DB-BD31-4B8C-83A1-F6EECF244321}">
-                <p14:modId xmlns:p14="http://schemas.microsoft.com/office/powerpoint/2010/main" xmlns="" val="3434022165"/>
+                <p14:modId xmlns="" xmlns:p14="http://schemas.microsoft.com/office/powerpoint/2010/main" val="3434022165"/>
               </p:ext>
             </p:extLst>
           </p:nvPr>
@@ -11327,11 +11380,7 @@
                     <a:p>
                       <a:r>
                         <a:rPr lang="en-US" sz="1600" baseline="0" dirty="0" smtClean="0"/>
-                        <a:t>The </a:t>
-                      </a:r>
-                      <a:r>
-                        <a:rPr lang="en-US" sz="1600" baseline="0" dirty="0" smtClean="0"/>
-                        <a:t>surface</a:t>
+                        <a:t>The surface</a:t>
                       </a:r>
                       <a:endParaRPr lang="en-US" sz="1600" dirty="0"/>
                     </a:p>
@@ -11367,11 +11416,7 @@
                     <a:p>
                       <a:r>
                         <a:rPr lang="en-US" sz="1600" dirty="0" smtClean="0"/>
-                        <a:t>Game </a:t>
-                      </a:r>
-                      <a:r>
-                        <a:rPr lang="en-US" sz="1600" dirty="0" smtClean="0"/>
-                        <a:t>settings</a:t>
+                        <a:t>Game settings</a:t>
                       </a:r>
                       <a:endParaRPr lang="en-US" sz="1600" dirty="0"/>
                     </a:p>
@@ -11663,7 +11708,7 @@
     </p:spTree>
     <p:extLst>
       <p:ext uri="{BB962C8B-B14F-4D97-AF65-F5344CB8AC3E}">
-        <p14:creationId xmlns="" xmlns:p14="http://schemas.microsoft.com/office/powerpoint/2010/main" val="4290846282"/>
+        <p14:creationId xmlns:p14="http://schemas.microsoft.com/office/powerpoint/2010/main" xmlns="" val="4290846282"/>
       </p:ext>
     </p:extLst>
   </p:cSld>
@@ -11760,7 +11805,7 @@
           <p:nvPr>
             <p:extLst>
               <p:ext uri="{D42A27DB-BD31-4B8C-83A1-F6EECF244321}">
-                <p14:modId xmlns:p14="http://schemas.microsoft.com/office/powerpoint/2010/main" xmlns="" val="3175424385"/>
+                <p14:modId xmlns="" xmlns:p14="http://schemas.microsoft.com/office/powerpoint/2010/main" val="3175424385"/>
               </p:ext>
             </p:extLst>
           </p:nvPr>
@@ -11957,7 +12002,6 @@
                         <a:rPr lang="en-US" sz="1600" dirty="0" smtClean="0"/>
                         <a:t>Google Ads</a:t>
                       </a:r>
-                      <a:endParaRPr lang="en-US" sz="1600" dirty="0" smtClean="0"/>
                     </a:p>
                     <a:p>
                       <a:endParaRPr lang="en-US" sz="1600" dirty="0"/>
@@ -11973,7 +12017,7 @@
     </p:spTree>
     <p:extLst>
       <p:ext uri="{BB962C8B-B14F-4D97-AF65-F5344CB8AC3E}">
-        <p14:creationId xmlns="" xmlns:p14="http://schemas.microsoft.com/office/powerpoint/2010/main" val="4290846282"/>
+        <p14:creationId xmlns:p14="http://schemas.microsoft.com/office/powerpoint/2010/main" xmlns="" val="4290846282"/>
       </p:ext>
     </p:extLst>
   </p:cSld>
@@ -12070,14 +12114,14 @@
           <p:nvPr>
             <p:extLst>
               <p:ext uri="{D42A27DB-BD31-4B8C-83A1-F6EECF244321}">
-                <p14:modId xmlns:p14="http://schemas.microsoft.com/office/powerpoint/2010/main" xmlns="" val="3175424385"/>
+                <p14:modId xmlns="" xmlns:p14="http://schemas.microsoft.com/office/powerpoint/2010/main" val="3175424385"/>
               </p:ext>
             </p:extLst>
           </p:nvPr>
         </p:nvGraphicFramePr>
         <p:xfrm>
-          <a:off x="2209800" y="1589257"/>
-          <a:ext cx="4771293" cy="4887743"/>
+          <a:off x="2286000" y="1541587"/>
+          <a:ext cx="4572000" cy="5087813"/>
         </p:xfrm>
         <a:graphic>
           <a:graphicData uri="http://schemas.openxmlformats.org/drawingml/2006/table">
@@ -12086,9 +12130,9 @@
                 <a:tableStyleId>{BC89EF96-8CEA-46FF-86C4-4CE0E7609802}</a:tableStyleId>
               </a:tblPr>
               <a:tblGrid>
-                <a:gridCol w="4771293"/>
+                <a:gridCol w="4572000"/>
               </a:tblGrid>
-              <a:tr h="617374">
+              <a:tr h="584942">
                 <a:tc>
                   <a:txBody>
                     <a:bodyPr/>
@@ -12108,7 +12152,7 @@
                   <a:tcPr/>
                 </a:tc>
               </a:tr>
-              <a:tr h="617374">
+              <a:tr h="584942">
                 <a:tc>
                   <a:txBody>
                     <a:bodyPr/>
@@ -12128,7 +12172,7 @@
                   <a:tcPr/>
                 </a:tc>
               </a:tr>
-              <a:tr h="617374">
+              <a:tr h="584942">
                 <a:tc>
                   <a:txBody>
                     <a:bodyPr/>
@@ -12165,7 +12209,7 @@
                   <a:tcPr/>
                 </a:tc>
               </a:tr>
-              <a:tr h="551698">
+              <a:tr h="548698">
                 <a:tc>
                   <a:txBody>
                     <a:bodyPr/>
@@ -12185,7 +12229,7 @@
                   <a:tcPr/>
                 </a:tc>
               </a:tr>
-              <a:tr h="352786">
+              <a:tr h="334253">
                 <a:tc>
                   <a:txBody>
                     <a:bodyPr/>
@@ -12201,7 +12245,7 @@
                   <a:tcPr/>
                 </a:tc>
               </a:tr>
-              <a:tr h="583643">
+              <a:tr h="552983">
                 <a:tc>
                   <a:txBody>
                     <a:bodyPr/>
@@ -12224,7 +12268,7 @@
                   <a:tcPr/>
                 </a:tc>
               </a:tr>
-              <a:tr h="352786">
+              <a:tr h="334253">
                 <a:tc>
                   <a:txBody>
                     <a:bodyPr/>
@@ -12244,7 +12288,7 @@
                   <a:tcPr/>
                 </a:tc>
               </a:tr>
-              <a:tr h="583643">
+              <a:tr h="552983">
                 <a:tc>
                   <a:txBody>
                     <a:bodyPr/>
@@ -12271,7 +12315,6 @@
                         <a:rPr lang="en-US" sz="1600" dirty="0" smtClean="0"/>
                         <a:t>Google Ads</a:t>
                       </a:r>
-                      <a:endParaRPr lang="en-US" sz="1600" dirty="0" smtClean="0"/>
                     </a:p>
                     <a:p>
                       <a:endParaRPr lang="en-US" sz="1600" dirty="0"/>
@@ -12280,7 +12323,7 @@
                   <a:tcPr/>
                 </a:tc>
               </a:tr>
-              <a:tr h="583643">
+              <a:tr h="398221">
                 <a:tc>
                   <a:txBody>
                     <a:bodyPr/>
@@ -12300,6 +12343,22 @@
                   <a:tcPr/>
                 </a:tc>
               </a:tr>
+              <a:tr h="552983">
+                <a:tc>
+                  <a:txBody>
+                    <a:bodyPr/>
+                    <a:lstStyle/>
+                    <a:p>
+                      <a:r>
+                        <a:rPr lang="en-US" sz="1600" dirty="0" smtClean="0"/>
+                        <a:t>Gestures / Long Click</a:t>
+                      </a:r>
+                      <a:endParaRPr lang="en-US" sz="1600" dirty="0"/>
+                    </a:p>
+                  </a:txBody>
+                  <a:tcPr/>
+                </a:tc>
+              </a:tr>
             </a:tbl>
           </a:graphicData>
         </a:graphic>
@@ -12307,7 +12366,7 @@
     </p:spTree>
     <p:extLst>
       <p:ext uri="{BB962C8B-B14F-4D97-AF65-F5344CB8AC3E}">
-        <p14:creationId xmlns="" xmlns:p14="http://schemas.microsoft.com/office/powerpoint/2010/main" val="4290846282"/>
+        <p14:creationId xmlns:p14="http://schemas.microsoft.com/office/powerpoint/2010/main" xmlns="" val="4290846282"/>
       </p:ext>
     </p:extLst>
   </p:cSld>
@@ -12422,7 +12481,7 @@
                   </a:schemeClr>
                 </a:solidFill>
               </a:rPr>
-              <a:t>QA</a:t>
+              <a:t>Bonus</a:t>
             </a:r>
             <a:endParaRPr lang="en-GB" sz="2800" b="1" dirty="0">
               <a:solidFill>
@@ -12437,7 +12496,7 @@
     </p:spTree>
     <p:extLst>
       <p:ext uri="{BB962C8B-B14F-4D97-AF65-F5344CB8AC3E}">
-        <p14:creationId xmlns="" xmlns:p14="http://schemas.microsoft.com/office/powerpoint/2010/main" val="538637548"/>
+        <p14:creationId xmlns:p14="http://schemas.microsoft.com/office/powerpoint/2010/main" xmlns="" val="538637548"/>
       </p:ext>
     </p:extLst>
   </p:cSld>
@@ -12545,16 +12604,6 @@
               <a:buNone/>
             </a:pPr>
             <a:r>
-              <a:rPr lang="en-GB" sz="2800" b="1" dirty="0">
-                <a:solidFill>
-                  <a:schemeClr val="accent3">
-                    <a:lumMod val="50000"/>
-                  </a:schemeClr>
-                </a:solidFill>
-              </a:rPr>
-              <a:t>Thank you </a:t>
-            </a:r>
-            <a:r>
               <a:rPr lang="en-GB" sz="2800" b="1" dirty="0" smtClean="0">
                 <a:solidFill>
                   <a:schemeClr val="accent3">
@@ -12562,27 +12611,7 @@
                   </a:schemeClr>
                 </a:solidFill>
               </a:rPr>
-              <a:t>for </a:t>
-            </a:r>
-            <a:r>
-              <a:rPr lang="en-GB" sz="2800" b="1" dirty="0">
-                <a:solidFill>
-                  <a:schemeClr val="accent3">
-                    <a:lumMod val="50000"/>
-                  </a:schemeClr>
-                </a:solidFill>
-              </a:rPr>
-              <a:t>listening</a:t>
-            </a:r>
-            <a:r>
-              <a:rPr lang="en-GB" sz="2800" b="1" dirty="0" smtClean="0">
-                <a:solidFill>
-                  <a:schemeClr val="accent3">
-                    <a:lumMod val="50000"/>
-                  </a:schemeClr>
-                </a:solidFill>
-              </a:rPr>
-              <a:t>!</a:t>
+              <a:t>QA</a:t>
             </a:r>
             <a:endParaRPr lang="en-GB" sz="2800" b="1" dirty="0">
               <a:solidFill>
@@ -12597,7 +12626,7 @@
     </p:spTree>
     <p:extLst>
       <p:ext uri="{BB962C8B-B14F-4D97-AF65-F5344CB8AC3E}">
-        <p14:creationId xmlns="" xmlns:p14="http://schemas.microsoft.com/office/powerpoint/2010/main" val="1010402895"/>
+        <p14:creationId xmlns:p14="http://schemas.microsoft.com/office/powerpoint/2010/main" xmlns="" val="538637548"/>
       </p:ext>
     </p:extLst>
   </p:cSld>
@@ -12688,7 +12717,6 @@
               <a:rPr lang="en-GB" sz="1800" dirty="0" smtClean="0"/>
               <a:t>Demo</a:t>
             </a:r>
-            <a:endParaRPr lang="en-GB" sz="1800" dirty="0" smtClean="0"/>
           </a:p>
           <a:p>
             <a:r>
@@ -12707,7 +12735,6 @@
               <a:rPr lang="en-GB" sz="1800" dirty="0" smtClean="0"/>
               <a:t>Extras</a:t>
             </a:r>
-            <a:endParaRPr lang="en-GB" sz="1800" dirty="0" smtClean="0"/>
           </a:p>
           <a:p>
             <a:r>
@@ -12757,7 +12784,167 @@
     </p:spTree>
     <p:extLst>
       <p:ext uri="{BB962C8B-B14F-4D97-AF65-F5344CB8AC3E}">
-        <p14:creationId xmlns="" xmlns:p14="http://schemas.microsoft.com/office/powerpoint/2010/main" val="828821643"/>
+        <p14:creationId xmlns:p14="http://schemas.microsoft.com/office/powerpoint/2010/main" xmlns="" val="828821643"/>
+      </p:ext>
+    </p:extLst>
+  </p:cSld>
+  <p:clrMapOvr>
+    <a:masterClrMapping/>
+  </p:clrMapOvr>
+  <p:timing>
+    <p:tnLst>
+      <p:par>
+        <p:cTn id="1" dur="indefinite" restart="never" nodeType="tmRoot"/>
+      </p:par>
+    </p:tnLst>
+  </p:timing>
+</p:sld>
+</file>
+
+<file path=ppt/slides/slide20.xml><?xml version="1.0" encoding="utf-8"?>
+<p:sld xmlns:a="http://schemas.openxmlformats.org/drawingml/2006/main" xmlns:r="http://schemas.openxmlformats.org/officeDocument/2006/relationships" xmlns:p="http://schemas.openxmlformats.org/presentationml/2006/main" showMasterSp="0">
+  <p:cSld>
+    <p:spTree>
+      <p:nvGrpSpPr>
+        <p:cNvPr id="1" name=""/>
+        <p:cNvGrpSpPr/>
+        <p:nvPr/>
+      </p:nvGrpSpPr>
+      <p:grpSpPr>
+        <a:xfrm>
+          <a:off x="0" y="0"/>
+          <a:ext cx="0" cy="0"/>
+          <a:chOff x="0" y="0"/>
+          <a:chExt cx="0" cy="0"/>
+        </a:xfrm>
+      </p:grpSpPr>
+      <p:sp>
+        <p:nvSpPr>
+          <p:cNvPr id="4" name="Slide Number Placeholder 3"/>
+          <p:cNvSpPr>
+            <a:spLocks noGrp="1"/>
+          </p:cNvSpPr>
+          <p:nvPr>
+            <p:ph type="sldNum" sz="quarter" idx="11"/>
+          </p:nvPr>
+        </p:nvSpPr>
+        <p:spPr/>
+        <p:txBody>
+          <a:bodyPr/>
+          <a:lstStyle/>
+          <a:p>
+            <a:fld id="{EF789A81-9B9B-445C-8A60-F916862B4649}" type="slidenum">
+              <a:rPr lang="en-GB" sz="2800" smtClean="0"/>
+              <a:pPr/>
+              <a:t>20</a:t>
+            </a:fld>
+            <a:endParaRPr lang="en-GB" sz="2800" dirty="0"/>
+          </a:p>
+        </p:txBody>
+      </p:sp>
+      <p:sp>
+        <p:nvSpPr>
+          <p:cNvPr id="11" name="Text Placeholder 10"/>
+          <p:cNvSpPr>
+            <a:spLocks noGrp="1"/>
+          </p:cNvSpPr>
+          <p:nvPr>
+            <p:ph type="body" sz="quarter" idx="12"/>
+          </p:nvPr>
+        </p:nvSpPr>
+        <p:spPr>
+          <a:xfrm>
+            <a:off x="539750" y="990600"/>
+            <a:ext cx="8064500" cy="4886325"/>
+          </a:xfrm>
+        </p:spPr>
+        <p:txBody>
+          <a:bodyPr/>
+          <a:lstStyle/>
+          <a:p>
+            <a:pPr marL="137160" indent="0">
+              <a:buNone/>
+            </a:pPr>
+            <a:endParaRPr lang="en-GB" dirty="0"/>
+          </a:p>
+          <a:p>
+            <a:pPr marL="137160" indent="0">
+              <a:buNone/>
+            </a:pPr>
+            <a:endParaRPr lang="en-GB" sz="2400" b="1" dirty="0" smtClean="0">
+              <a:solidFill>
+                <a:srgbClr val="FF0000"/>
+              </a:solidFill>
+            </a:endParaRPr>
+          </a:p>
+          <a:p>
+            <a:pPr marL="137160" indent="0" algn="ctr">
+              <a:buNone/>
+            </a:pPr>
+            <a:endParaRPr lang="en-GB" sz="2400" b="1" dirty="0" smtClean="0">
+              <a:solidFill>
+                <a:srgbClr val="FF0000"/>
+              </a:solidFill>
+            </a:endParaRPr>
+          </a:p>
+          <a:p>
+            <a:pPr marL="137160" indent="0" algn="ctr">
+              <a:buNone/>
+            </a:pPr>
+            <a:r>
+              <a:rPr lang="en-GB" sz="2800" b="1" dirty="0">
+                <a:solidFill>
+                  <a:schemeClr val="accent3">
+                    <a:lumMod val="50000"/>
+                  </a:schemeClr>
+                </a:solidFill>
+              </a:rPr>
+              <a:t>Thank you </a:t>
+            </a:r>
+            <a:r>
+              <a:rPr lang="en-GB" sz="2800" b="1" dirty="0" smtClean="0">
+                <a:solidFill>
+                  <a:schemeClr val="accent3">
+                    <a:lumMod val="50000"/>
+                  </a:schemeClr>
+                </a:solidFill>
+              </a:rPr>
+              <a:t>for </a:t>
+            </a:r>
+            <a:r>
+              <a:rPr lang="en-GB" sz="2800" b="1" dirty="0">
+                <a:solidFill>
+                  <a:schemeClr val="accent3">
+                    <a:lumMod val="50000"/>
+                  </a:schemeClr>
+                </a:solidFill>
+              </a:rPr>
+              <a:t>listening</a:t>
+            </a:r>
+            <a:r>
+              <a:rPr lang="en-GB" sz="2800" b="1" dirty="0" smtClean="0">
+                <a:solidFill>
+                  <a:schemeClr val="accent3">
+                    <a:lumMod val="50000"/>
+                  </a:schemeClr>
+                </a:solidFill>
+              </a:rPr>
+              <a:t>!</a:t>
+            </a:r>
+            <a:endParaRPr lang="en-GB" sz="2800" b="1" dirty="0">
+              <a:solidFill>
+                <a:schemeClr val="accent3">
+                  <a:lumMod val="50000"/>
+                </a:schemeClr>
+              </a:solidFill>
+            </a:endParaRPr>
+          </a:p>
+        </p:txBody>
+      </p:sp>
+    </p:spTree>
+    <p:extLst>
+      <p:ext uri="{BB962C8B-B14F-4D97-AF65-F5344CB8AC3E}">
+        <p14:creationId xmlns:p14="http://schemas.microsoft.com/office/powerpoint/2010/main" xmlns="" val="1010402895"/>
       </p:ext>
     </p:extLst>
   </p:cSld>
@@ -12815,11 +13002,7 @@
           <a:p>
             <a:r>
               <a:rPr lang="en-GB" sz="2800" b="1" dirty="0" smtClean="0"/>
-              <a:t>Recap: Project </a:t>
-            </a:r>
-            <a:r>
-              <a:rPr lang="en-GB" sz="2800" b="1" dirty="0" smtClean="0"/>
-              <a:t>Overview</a:t>
+              <a:t>Recap: Project Overview</a:t>
             </a:r>
             <a:endParaRPr lang="en-GB" sz="2800" b="1" dirty="0"/>
           </a:p>
@@ -12935,7 +13118,7 @@
     </p:spTree>
     <p:extLst>
       <p:ext uri="{BB962C8B-B14F-4D97-AF65-F5344CB8AC3E}">
-        <p14:creationId xmlns="" xmlns:p14="http://schemas.microsoft.com/office/powerpoint/2010/main" val="4290846282"/>
+        <p14:creationId xmlns:p14="http://schemas.microsoft.com/office/powerpoint/2010/main" xmlns="" val="4290846282"/>
       </p:ext>
     </p:extLst>
   </p:cSld>
@@ -12993,11 +13176,7 @@
           <a:p>
             <a:r>
               <a:rPr lang="en-GB" sz="2800" b="1" dirty="0" smtClean="0"/>
-              <a:t>Recap: Description </a:t>
-            </a:r>
-            <a:r>
-              <a:rPr lang="en-GB" sz="2800" b="1" dirty="0" smtClean="0"/>
-              <a:t>of the Project</a:t>
+              <a:t>Recap: Description of the Project</a:t>
             </a:r>
             <a:endParaRPr lang="en-GB" sz="2800" b="1" dirty="0"/>
           </a:p>
@@ -13213,7 +13392,7 @@
     </p:spTree>
     <p:extLst>
       <p:ext uri="{BB962C8B-B14F-4D97-AF65-F5344CB8AC3E}">
-        <p14:creationId xmlns="" xmlns:p14="http://schemas.microsoft.com/office/powerpoint/2010/main" val="4290846282"/>
+        <p14:creationId xmlns:p14="http://schemas.microsoft.com/office/powerpoint/2010/main" xmlns="" val="4290846282"/>
       </p:ext>
     </p:extLst>
   </p:cSld>
@@ -13271,15 +13450,7 @@
           <a:p>
             <a:r>
               <a:rPr lang="en-GB" sz="2800" b="1" dirty="0" smtClean="0"/>
-              <a:t>Recap: Description </a:t>
-            </a:r>
-            <a:r>
-              <a:rPr lang="en-GB" sz="2800" b="1" dirty="0" smtClean="0"/>
-              <a:t>of </a:t>
-            </a:r>
-            <a:r>
-              <a:rPr lang="en-GB" sz="2800" b="1" dirty="0" smtClean="0"/>
-              <a:t>the Project</a:t>
+              <a:t>Recap: Description of the Project</a:t>
             </a:r>
             <a:endParaRPr lang="en-GB" sz="2800" b="1" dirty="0"/>
           </a:p>
@@ -13440,7 +13611,7 @@
     </p:spTree>
     <p:extLst>
       <p:ext uri="{BB962C8B-B14F-4D97-AF65-F5344CB8AC3E}">
-        <p14:creationId xmlns="" xmlns:p14="http://schemas.microsoft.com/office/powerpoint/2010/main" val="4290846282"/>
+        <p14:creationId xmlns:p14="http://schemas.microsoft.com/office/powerpoint/2010/main" xmlns="" val="4290846282"/>
       </p:ext>
     </p:extLst>
   </p:cSld>
@@ -13498,11 +13669,7 @@
           <a:p>
             <a:r>
               <a:rPr lang="en-GB" sz="2800" b="1" dirty="0" smtClean="0"/>
-              <a:t>Recap: Description </a:t>
-            </a:r>
-            <a:r>
-              <a:rPr lang="en-GB" sz="2800" b="1" dirty="0" smtClean="0"/>
-              <a:t>of the Project</a:t>
+              <a:t>Recap: Description of the Project</a:t>
             </a:r>
             <a:endParaRPr lang="en-GB" sz="2800" b="1" dirty="0"/>
           </a:p>
@@ -13620,15 +13787,7 @@
                   <a:srgbClr val="000000"/>
                 </a:solidFill>
               </a:rPr>
-              <a:t> to render in full screen </a:t>
-            </a:r>
-            <a:r>
-              <a:rPr lang="en-GB" sz="1600" dirty="0" smtClean="0">
-                <a:solidFill>
-                  <a:srgbClr val="000000"/>
-                </a:solidFill>
-              </a:rPr>
-              <a:t>mode</a:t>
+              <a:t> to render in full screen mode</a:t>
             </a:r>
           </a:p>
           <a:p>
@@ -13644,11 +13803,6 @@
               </a:rPr>
               <a:t>Use of fragments to render top bar with “Back” option</a:t>
             </a:r>
-            <a:endParaRPr lang="en-GB" sz="1600" strike="sngStrike" dirty="0" smtClean="0">
-              <a:solidFill>
-                <a:srgbClr val="000000"/>
-              </a:solidFill>
-            </a:endParaRPr>
           </a:p>
           <a:p>
             <a:pPr lvl="1">
@@ -13661,15 +13815,7 @@
                   <a:srgbClr val="000000"/>
                 </a:solidFill>
               </a:rPr>
-              <a:t>Use </a:t>
-            </a:r>
-            <a:r>
-              <a:rPr lang="en-GB" sz="1600" dirty="0" smtClean="0">
-                <a:solidFill>
-                  <a:srgbClr val="000000"/>
-                </a:solidFill>
-              </a:rPr>
-              <a:t>of multiple types of UI widgets, including buttons, images, seek bars, and </a:t>
+              <a:t>Use of multiple types of UI widgets, including buttons, images, seek bars, and </a:t>
             </a:r>
             <a:r>
               <a:rPr lang="en-GB" sz="1600" dirty="0" err="1" smtClean="0">
@@ -13783,7 +13929,7 @@
     </p:spTree>
     <p:extLst>
       <p:ext uri="{BB962C8B-B14F-4D97-AF65-F5344CB8AC3E}">
-        <p14:creationId xmlns="" xmlns:p14="http://schemas.microsoft.com/office/powerpoint/2010/main" val="3725726106"/>
+        <p14:creationId xmlns:p14="http://schemas.microsoft.com/office/powerpoint/2010/main" xmlns="" val="3725726106"/>
       </p:ext>
     </p:extLst>
   </p:cSld>
@@ -13841,11 +13987,7 @@
           <a:p>
             <a:r>
               <a:rPr lang="en-GB" sz="2800" b="1" dirty="0" smtClean="0"/>
-              <a:t>Recap: Project </a:t>
-            </a:r>
-            <a:r>
-              <a:rPr lang="en-GB" sz="2800" b="1" dirty="0" smtClean="0"/>
-              <a:t>Design and Navigation</a:t>
+              <a:t>Recap: Project Design and Navigation</a:t>
             </a:r>
             <a:endParaRPr lang="en-GB" sz="2800" b="1" dirty="0"/>
           </a:p>
@@ -13958,7 +14100,7 @@
     </p:spTree>
     <p:extLst>
       <p:ext uri="{BB962C8B-B14F-4D97-AF65-F5344CB8AC3E}">
-        <p14:creationId xmlns="" xmlns:p14="http://schemas.microsoft.com/office/powerpoint/2010/main" val="4290846282"/>
+        <p14:creationId xmlns:p14="http://schemas.microsoft.com/office/powerpoint/2010/main" xmlns="" val="4290846282"/>
       </p:ext>
     </p:extLst>
   </p:cSld>
@@ -14016,11 +14158,7 @@
           <a:p>
             <a:r>
               <a:rPr lang="en-GB" sz="2800" b="1" dirty="0" smtClean="0"/>
-              <a:t>Recap: Project </a:t>
-            </a:r>
-            <a:r>
-              <a:rPr lang="en-GB" sz="2800" b="1" dirty="0" smtClean="0"/>
-              <a:t>Design and Navigation</a:t>
+              <a:t>Recap: Project Design and Navigation</a:t>
             </a:r>
             <a:endParaRPr lang="en-GB" sz="2800" b="1" dirty="0"/>
           </a:p>
@@ -14077,7 +14215,7 @@
     </p:spTree>
     <p:extLst>
       <p:ext uri="{BB962C8B-B14F-4D97-AF65-F5344CB8AC3E}">
-        <p14:creationId xmlns="" xmlns:p14="http://schemas.microsoft.com/office/powerpoint/2010/main" val="4290846282"/>
+        <p14:creationId xmlns:p14="http://schemas.microsoft.com/office/powerpoint/2010/main" xmlns="" val="4290846282"/>
       </p:ext>
     </p:extLst>
   </p:cSld>
@@ -14135,11 +14273,7 @@
           <a:p>
             <a:r>
               <a:rPr lang="en-GB" sz="2800" b="1" dirty="0" smtClean="0"/>
-              <a:t>Recap: Project </a:t>
-            </a:r>
-            <a:r>
-              <a:rPr lang="en-GB" sz="2800" b="1" dirty="0" smtClean="0"/>
-              <a:t>Design and Navigation</a:t>
+              <a:t>Recap: Project Design and Navigation</a:t>
             </a:r>
             <a:endParaRPr lang="en-GB" sz="2800" b="1" dirty="0"/>
           </a:p>
@@ -14204,7 +14338,7 @@
     </p:spTree>
     <p:extLst>
       <p:ext uri="{BB962C8B-B14F-4D97-AF65-F5344CB8AC3E}">
-        <p14:creationId xmlns="" xmlns:p14="http://schemas.microsoft.com/office/powerpoint/2010/main" val="4290846282"/>
+        <p14:creationId xmlns:p14="http://schemas.microsoft.com/office/powerpoint/2010/main" xmlns="" val="4290846282"/>
       </p:ext>
     </p:extLst>
   </p:cSld>

</xml_diff>